<commit_message>
Moved out of frame objects into the fame
</commit_message>
<xml_diff>
--- a/docs/diagrams/AddPictureSequenceDiagram.pptx
+++ b/docs/diagrams/AddPictureSequenceDiagram.pptx
@@ -208,7 +208,7 @@
           <a:p>
             <a:fld id="{F5CC4B3F-88C1-4FFA-B1B6-F41C21DC6924}" type="datetimeFigureOut">
               <a:rPr lang="en-US" smtClean="0"/>
-              <a:t>3/28/2018</a:t>
+              <a:t>4/4/2018</a:t>
             </a:fld>
             <a:endParaRPr lang="en-US"/>
           </a:p>
@@ -743,7 +743,7 @@
           <a:p>
             <a:fld id="{78C97017-6FC3-485B-9764-EAC9E56C1D49}" type="datetimeFigureOut">
               <a:rPr lang="en-US" smtClean="0"/>
-              <a:t>3/28/2018</a:t>
+              <a:t>4/4/2018</a:t>
             </a:fld>
             <a:endParaRPr lang="en-US"/>
           </a:p>
@@ -911,7 +911,7 @@
           <a:p>
             <a:fld id="{78C97017-6FC3-485B-9764-EAC9E56C1D49}" type="datetimeFigureOut">
               <a:rPr lang="en-US" smtClean="0"/>
-              <a:t>3/28/2018</a:t>
+              <a:t>4/4/2018</a:t>
             </a:fld>
             <a:endParaRPr lang="en-US"/>
           </a:p>
@@ -1089,7 +1089,7 @@
           <a:p>
             <a:fld id="{78C97017-6FC3-485B-9764-EAC9E56C1D49}" type="datetimeFigureOut">
               <a:rPr lang="en-US" smtClean="0"/>
-              <a:t>3/28/2018</a:t>
+              <a:t>4/4/2018</a:t>
             </a:fld>
             <a:endParaRPr lang="en-US"/>
           </a:p>
@@ -1257,7 +1257,7 @@
           <a:p>
             <a:fld id="{78C97017-6FC3-485B-9764-EAC9E56C1D49}" type="datetimeFigureOut">
               <a:rPr lang="en-US" smtClean="0"/>
-              <a:t>3/28/2018</a:t>
+              <a:t>4/4/2018</a:t>
             </a:fld>
             <a:endParaRPr lang="en-US"/>
           </a:p>
@@ -1502,7 +1502,7 @@
           <a:p>
             <a:fld id="{78C97017-6FC3-485B-9764-EAC9E56C1D49}" type="datetimeFigureOut">
               <a:rPr lang="en-US" smtClean="0"/>
-              <a:t>3/28/2018</a:t>
+              <a:t>4/4/2018</a:t>
             </a:fld>
             <a:endParaRPr lang="en-US"/>
           </a:p>
@@ -1787,7 +1787,7 @@
           <a:p>
             <a:fld id="{78C97017-6FC3-485B-9764-EAC9E56C1D49}" type="datetimeFigureOut">
               <a:rPr lang="en-US" smtClean="0"/>
-              <a:t>3/28/2018</a:t>
+              <a:t>4/4/2018</a:t>
             </a:fld>
             <a:endParaRPr lang="en-US"/>
           </a:p>
@@ -2206,7 +2206,7 @@
           <a:p>
             <a:fld id="{78C97017-6FC3-485B-9764-EAC9E56C1D49}" type="datetimeFigureOut">
               <a:rPr lang="en-US" smtClean="0"/>
-              <a:t>3/28/2018</a:t>
+              <a:t>4/4/2018</a:t>
             </a:fld>
             <a:endParaRPr lang="en-US"/>
           </a:p>
@@ -2323,7 +2323,7 @@
           <a:p>
             <a:fld id="{78C97017-6FC3-485B-9764-EAC9E56C1D49}" type="datetimeFigureOut">
               <a:rPr lang="en-US" smtClean="0"/>
-              <a:t>3/28/2018</a:t>
+              <a:t>4/4/2018</a:t>
             </a:fld>
             <a:endParaRPr lang="en-US"/>
           </a:p>
@@ -2418,7 +2418,7 @@
           <a:p>
             <a:fld id="{78C97017-6FC3-485B-9764-EAC9E56C1D49}" type="datetimeFigureOut">
               <a:rPr lang="en-US" smtClean="0"/>
-              <a:t>3/28/2018</a:t>
+              <a:t>4/4/2018</a:t>
             </a:fld>
             <a:endParaRPr lang="en-US"/>
           </a:p>
@@ -2693,7 +2693,7 @@
           <a:p>
             <a:fld id="{78C97017-6FC3-485B-9764-EAC9E56C1D49}" type="datetimeFigureOut">
               <a:rPr lang="en-US" smtClean="0"/>
-              <a:t>3/28/2018</a:t>
+              <a:t>4/4/2018</a:t>
             </a:fld>
             <a:endParaRPr lang="en-US"/>
           </a:p>
@@ -2945,7 +2945,7 @@
           <a:p>
             <a:fld id="{78C97017-6FC3-485B-9764-EAC9E56C1D49}" type="datetimeFigureOut">
               <a:rPr lang="en-US" smtClean="0"/>
-              <a:t>3/28/2018</a:t>
+              <a:t>4/4/2018</a:t>
             </a:fld>
             <a:endParaRPr lang="en-US"/>
           </a:p>
@@ -3156,7 +3156,7 @@
           <a:p>
             <a:fld id="{78C97017-6FC3-485B-9764-EAC9E56C1D49}" type="datetimeFigureOut">
               <a:rPr lang="en-US" smtClean="0"/>
-              <a:t>3/28/2018</a:t>
+              <a:t>4/4/2018</a:t>
             </a:fld>
             <a:endParaRPr lang="en-US"/>
           </a:p>
@@ -3592,7 +3592,7 @@
         </p:nvSpPr>
         <p:spPr>
           <a:xfrm>
-            <a:off x="5632921" y="-868620"/>
+            <a:off x="5525998" y="4771581"/>
             <a:ext cx="2100239" cy="500323"/>
           </a:xfrm>
           <a:prstGeom prst="rect">
@@ -3745,7 +3745,7 @@
         </p:nvSpPr>
         <p:spPr>
           <a:xfrm>
-            <a:off x="9317992" y="-1043096"/>
+            <a:off x="9230458" y="4590473"/>
             <a:ext cx="1759109" cy="674794"/>
           </a:xfrm>
           <a:prstGeom prst="rect">
@@ -5300,7 +5300,7 @@
         <p:spPr>
           <a:xfrm>
             <a:off x="12435209" y="7896742"/>
-            <a:ext cx="3440749" cy="622991"/>
+            <a:ext cx="3678001" cy="622991"/>
           </a:xfrm>
           <a:prstGeom prst="rect">
             <a:avLst/>
@@ -5330,7 +5330,7 @@
             </a:r>
             <a:r>
               <a:rPr lang="en-US" sz="2024" dirty="0" err="1"/>
-              <a:t>AddPictureCOmmandParser</a:t>
+              <a:t>AddPictureCommandParser</a:t>
             </a:r>
             <a:endParaRPr lang="en-US" sz="2024" dirty="0"/>
           </a:p>
@@ -5450,7 +5450,7 @@
         </p:nvCxnSpPr>
         <p:spPr>
           <a:xfrm>
-            <a:off x="21929764" y="9994297"/>
+            <a:off x="17571087" y="9997194"/>
             <a:ext cx="1926591" cy="0"/>
           </a:xfrm>
           <a:prstGeom prst="straightConnector1">

</xml_diff>